<commit_message>
Dotnet Session 2 - Login/Register
</commit_message>
<xml_diff>
--- a/Dotnet/dotnet Session 1.pptx
+++ b/Dotnet/dotnet Session 1.pptx
@@ -12410,10 +12410,10 @@
         <a:lstStyle/>
         <a:p>
           <a:r>
-            <a:rPr lang="en-GB" dirty="0"/>
+            <a:rPr lang="en-GB" u="sng" dirty="0"/>
             <a:t>Notes app API</a:t>
           </a:r>
-          <a:endParaRPr lang="fr-FR" dirty="0"/>
+          <a:endParaRPr lang="fr-FR" u="sng" dirty="0"/>
         </a:p>
       </dgm:t>
     </dgm:pt>
@@ -17992,10 +17992,10 @@
             <a:buChar char="•"/>
           </a:pPr>
           <a:r>
-            <a:rPr lang="en-GB" sz="1700" kern="1200" dirty="0"/>
+            <a:rPr lang="en-GB" sz="1700" u="sng" kern="1200" dirty="0"/>
             <a:t>Notes app API</a:t>
           </a:r>
-          <a:endParaRPr lang="fr-FR" sz="1700" kern="1200" dirty="0"/>
+          <a:endParaRPr lang="fr-FR" sz="1700" u="sng" kern="1200" dirty="0"/>
         </a:p>
         <a:p>
           <a:pPr marL="342900" lvl="2" indent="-171450" algn="l" defTabSz="755650">
@@ -37177,7 +37177,7 @@
           <a:p>
             <a:fld id="{C2E97FD6-B269-4CD7-A073-512C01108090}" type="datetimeFigureOut">
               <a:rPr lang="fr-FR" smtClean="0"/>
-              <a:t>26/09/2023</a:t>
+              <a:t>27/09/2023</a:t>
             </a:fld>
             <a:endParaRPr lang="fr-FR"/>
           </a:p>
@@ -37385,7 +37385,7 @@
           <a:p>
             <a:fld id="{C2E97FD6-B269-4CD7-A073-512C01108090}" type="datetimeFigureOut">
               <a:rPr lang="fr-FR" smtClean="0"/>
-              <a:t>26/09/2023</a:t>
+              <a:t>27/09/2023</a:t>
             </a:fld>
             <a:endParaRPr lang="fr-FR"/>
           </a:p>
@@ -37641,7 +37641,7 @@
           <a:p>
             <a:fld id="{C2E97FD6-B269-4CD7-A073-512C01108090}" type="datetimeFigureOut">
               <a:rPr lang="fr-FR" smtClean="0"/>
-              <a:t>26/09/2023</a:t>
+              <a:t>27/09/2023</a:t>
             </a:fld>
             <a:endParaRPr lang="fr-FR"/>
           </a:p>
@@ -37811,7 +37811,7 @@
           <a:p>
             <a:fld id="{C2E97FD6-B269-4CD7-A073-512C01108090}" type="datetimeFigureOut">
               <a:rPr lang="fr-FR" smtClean="0"/>
-              <a:t>26/09/2023</a:t>
+              <a:t>27/09/2023</a:t>
             </a:fld>
             <a:endParaRPr lang="fr-FR"/>
           </a:p>
@@ -38154,7 +38154,7 @@
           <a:p>
             <a:fld id="{C2E97FD6-B269-4CD7-A073-512C01108090}" type="datetimeFigureOut">
               <a:rPr lang="fr-FR" smtClean="0"/>
-              <a:t>26/09/2023</a:t>
+              <a:t>27/09/2023</a:t>
             </a:fld>
             <a:endParaRPr lang="fr-FR"/>
           </a:p>
@@ -38429,7 +38429,7 @@
           <a:p>
             <a:fld id="{C2E97FD6-B269-4CD7-A073-512C01108090}" type="datetimeFigureOut">
               <a:rPr lang="fr-FR" smtClean="0"/>
-              <a:t>26/09/2023</a:t>
+              <a:t>27/09/2023</a:t>
             </a:fld>
             <a:endParaRPr lang="fr-FR"/>
           </a:p>
@@ -38808,7 +38808,7 @@
           <a:p>
             <a:fld id="{C2E97FD6-B269-4CD7-A073-512C01108090}" type="datetimeFigureOut">
               <a:rPr lang="fr-FR" smtClean="0"/>
-              <a:t>26/09/2023</a:t>
+              <a:t>27/09/2023</a:t>
             </a:fld>
             <a:endParaRPr lang="fr-FR"/>
           </a:p>
@@ -38926,7 +38926,7 @@
           <a:p>
             <a:fld id="{C2E97FD6-B269-4CD7-A073-512C01108090}" type="datetimeFigureOut">
               <a:rPr lang="fr-FR" smtClean="0"/>
-              <a:t>26/09/2023</a:t>
+              <a:t>27/09/2023</a:t>
             </a:fld>
             <a:endParaRPr lang="fr-FR"/>
           </a:p>
@@ -39097,7 +39097,7 @@
           <a:p>
             <a:fld id="{C2E97FD6-B269-4CD7-A073-512C01108090}" type="datetimeFigureOut">
               <a:rPr lang="fr-FR" smtClean="0"/>
-              <a:t>26/09/2023</a:t>
+              <a:t>27/09/2023</a:t>
             </a:fld>
             <a:endParaRPr lang="fr-FR"/>
           </a:p>
@@ -39451,7 +39451,7 @@
           <a:p>
             <a:fld id="{C2E97FD6-B269-4CD7-A073-512C01108090}" type="datetimeFigureOut">
               <a:rPr lang="fr-FR" smtClean="0"/>
-              <a:t>26/09/2023</a:t>
+              <a:t>27/09/2023</a:t>
             </a:fld>
             <a:endParaRPr lang="fr-FR"/>
           </a:p>
@@ -39828,7 +39828,7 @@
           <a:p>
             <a:fld id="{C2E97FD6-B269-4CD7-A073-512C01108090}" type="datetimeFigureOut">
               <a:rPr lang="fr-FR" smtClean="0"/>
-              <a:t>26/09/2023</a:t>
+              <a:t>27/09/2023</a:t>
             </a:fld>
             <a:endParaRPr lang="fr-FR"/>
           </a:p>
@@ -40115,7 +40115,7 @@
           <a:p>
             <a:fld id="{C2E97FD6-B269-4CD7-A073-512C01108090}" type="datetimeFigureOut">
               <a:rPr lang="fr-FR" smtClean="0"/>
-              <a:t>26/09/2023</a:t>
+              <a:t>27/09/2023</a:t>
             </a:fld>
             <a:endParaRPr lang="fr-FR"/>
           </a:p>
@@ -40771,6 +40771,48 @@
           </a:prstGeom>
         </p:spPr>
       </p:pic>
+      <p:sp>
+        <p:nvSpPr>
+          <p:cNvPr id="5" name="TextBox 4">
+            <a:extLst>
+              <a:ext uri="{FF2B5EF4-FFF2-40B4-BE49-F238E27FC236}">
+                <a16:creationId xmlns:a16="http://schemas.microsoft.com/office/drawing/2014/main" id="{779AB2AE-6F22-4B8A-89B3-AD8397D35C9A}"/>
+              </a:ext>
+            </a:extLst>
+          </p:cNvPr>
+          <p:cNvSpPr txBox="1"/>
+          <p:nvPr/>
+        </p:nvSpPr>
+        <p:spPr>
+          <a:xfrm>
+            <a:off x="1097280" y="6409081"/>
+            <a:ext cx="6964540" cy="369332"/>
+          </a:xfrm>
+          <a:prstGeom prst="rect">
+            <a:avLst/>
+          </a:prstGeom>
+          <a:noFill/>
+        </p:spPr>
+        <p:txBody>
+          <a:bodyPr wrap="square">
+            <a:spAutoFit/>
+          </a:bodyPr>
+          <a:lstStyle/>
+          <a:p>
+            <a:r>
+              <a:rPr lang="en-GB" dirty="0">
+                <a:solidFill>
+                  <a:schemeClr val="accent1">
+                    <a:lumMod val="50000"/>
+                  </a:schemeClr>
+                </a:solidFill>
+              </a:rPr>
+              <a:t>Code Mentor Mauritius - Dotnet Sessions – Full Stack Web Development</a:t>
+            </a:r>
+            <a:endParaRPr lang="fr-FR" dirty="0"/>
+          </a:p>
+        </p:txBody>
+      </p:sp>
     </p:spTree>
     <p:extLst>
       <p:ext uri="{BB962C8B-B14F-4D97-AF65-F5344CB8AC3E}">
@@ -40944,6 +40986,48 @@
           </a:prstGeom>
         </p:spPr>
       </p:pic>
+      <p:sp>
+        <p:nvSpPr>
+          <p:cNvPr id="6" name="TextBox 5">
+            <a:extLst>
+              <a:ext uri="{FF2B5EF4-FFF2-40B4-BE49-F238E27FC236}">
+                <a16:creationId xmlns:a16="http://schemas.microsoft.com/office/drawing/2014/main" id="{4724F1E2-B1F1-4888-813B-146E61BE8E89}"/>
+              </a:ext>
+            </a:extLst>
+          </p:cNvPr>
+          <p:cNvSpPr txBox="1"/>
+          <p:nvPr/>
+        </p:nvSpPr>
+        <p:spPr>
+          <a:xfrm>
+            <a:off x="1097280" y="6409081"/>
+            <a:ext cx="6964540" cy="369332"/>
+          </a:xfrm>
+          <a:prstGeom prst="rect">
+            <a:avLst/>
+          </a:prstGeom>
+          <a:noFill/>
+        </p:spPr>
+        <p:txBody>
+          <a:bodyPr wrap="square">
+            <a:spAutoFit/>
+          </a:bodyPr>
+          <a:lstStyle/>
+          <a:p>
+            <a:r>
+              <a:rPr lang="en-GB" dirty="0">
+                <a:solidFill>
+                  <a:schemeClr val="accent1">
+                    <a:lumMod val="50000"/>
+                  </a:schemeClr>
+                </a:solidFill>
+              </a:rPr>
+              <a:t>Code Mentor Mauritius - Dotnet Sessions – Full Stack Web Development</a:t>
+            </a:r>
+            <a:endParaRPr lang="fr-FR" dirty="0"/>
+          </a:p>
+        </p:txBody>
+      </p:sp>
     </p:spTree>
     <p:extLst>
       <p:ext uri="{BB962C8B-B14F-4D97-AF65-F5344CB8AC3E}">
@@ -41087,6 +41171,48 @@
           </a:prstGeom>
         </p:spPr>
       </p:pic>
+      <p:sp>
+        <p:nvSpPr>
+          <p:cNvPr id="6" name="TextBox 5">
+            <a:extLst>
+              <a:ext uri="{FF2B5EF4-FFF2-40B4-BE49-F238E27FC236}">
+                <a16:creationId xmlns:a16="http://schemas.microsoft.com/office/drawing/2014/main" id="{3A29C8D2-AFBD-4A94-A6E6-74758E79BFA5}"/>
+              </a:ext>
+            </a:extLst>
+          </p:cNvPr>
+          <p:cNvSpPr txBox="1"/>
+          <p:nvPr/>
+        </p:nvSpPr>
+        <p:spPr>
+          <a:xfrm>
+            <a:off x="1097280" y="6409081"/>
+            <a:ext cx="6964540" cy="369332"/>
+          </a:xfrm>
+          <a:prstGeom prst="rect">
+            <a:avLst/>
+          </a:prstGeom>
+          <a:noFill/>
+        </p:spPr>
+        <p:txBody>
+          <a:bodyPr wrap="square">
+            <a:spAutoFit/>
+          </a:bodyPr>
+          <a:lstStyle/>
+          <a:p>
+            <a:r>
+              <a:rPr lang="en-GB" dirty="0">
+                <a:solidFill>
+                  <a:schemeClr val="accent1">
+                    <a:lumMod val="50000"/>
+                  </a:schemeClr>
+                </a:solidFill>
+              </a:rPr>
+              <a:t>Code Mentor Mauritius - Dotnet Sessions – Full Stack Web Development</a:t>
+            </a:r>
+            <a:endParaRPr lang="fr-FR" dirty="0"/>
+          </a:p>
+        </p:txBody>
+      </p:sp>
     </p:spTree>
     <p:extLst>
       <p:ext uri="{BB962C8B-B14F-4D97-AF65-F5344CB8AC3E}">
@@ -41230,6 +41356,48 @@
           </a:prstGeom>
         </p:spPr>
       </p:pic>
+      <p:sp>
+        <p:nvSpPr>
+          <p:cNvPr id="6" name="TextBox 5">
+            <a:extLst>
+              <a:ext uri="{FF2B5EF4-FFF2-40B4-BE49-F238E27FC236}">
+                <a16:creationId xmlns:a16="http://schemas.microsoft.com/office/drawing/2014/main" id="{21F49A56-988E-489F-A88C-BBCE9714C371}"/>
+              </a:ext>
+            </a:extLst>
+          </p:cNvPr>
+          <p:cNvSpPr txBox="1"/>
+          <p:nvPr/>
+        </p:nvSpPr>
+        <p:spPr>
+          <a:xfrm>
+            <a:off x="1097280" y="6409081"/>
+            <a:ext cx="6964540" cy="369332"/>
+          </a:xfrm>
+          <a:prstGeom prst="rect">
+            <a:avLst/>
+          </a:prstGeom>
+          <a:noFill/>
+        </p:spPr>
+        <p:txBody>
+          <a:bodyPr wrap="square">
+            <a:spAutoFit/>
+          </a:bodyPr>
+          <a:lstStyle/>
+          <a:p>
+            <a:r>
+              <a:rPr lang="en-GB" dirty="0">
+                <a:solidFill>
+                  <a:schemeClr val="accent1">
+                    <a:lumMod val="50000"/>
+                  </a:schemeClr>
+                </a:solidFill>
+              </a:rPr>
+              <a:t>Code Mentor Mauritius - Dotnet Sessions – Full Stack Web Development</a:t>
+            </a:r>
+            <a:endParaRPr lang="fr-FR" dirty="0"/>
+          </a:p>
+        </p:txBody>
+      </p:sp>
     </p:spTree>
     <p:extLst>
       <p:ext uri="{BB962C8B-B14F-4D97-AF65-F5344CB8AC3E}">
@@ -41365,6 +41533,48 @@
           </a:prstGeom>
         </p:spPr>
       </p:pic>
+      <p:sp>
+        <p:nvSpPr>
+          <p:cNvPr id="6" name="TextBox 5">
+            <a:extLst>
+              <a:ext uri="{FF2B5EF4-FFF2-40B4-BE49-F238E27FC236}">
+                <a16:creationId xmlns:a16="http://schemas.microsoft.com/office/drawing/2014/main" id="{6A8B8322-2D60-4C2F-B988-A746D1F34CB5}"/>
+              </a:ext>
+            </a:extLst>
+          </p:cNvPr>
+          <p:cNvSpPr txBox="1"/>
+          <p:nvPr/>
+        </p:nvSpPr>
+        <p:spPr>
+          <a:xfrm>
+            <a:off x="1097280" y="6409081"/>
+            <a:ext cx="6964540" cy="369332"/>
+          </a:xfrm>
+          <a:prstGeom prst="rect">
+            <a:avLst/>
+          </a:prstGeom>
+          <a:noFill/>
+        </p:spPr>
+        <p:txBody>
+          <a:bodyPr wrap="square">
+            <a:spAutoFit/>
+          </a:bodyPr>
+          <a:lstStyle/>
+          <a:p>
+            <a:r>
+              <a:rPr lang="en-GB" dirty="0">
+                <a:solidFill>
+                  <a:schemeClr val="accent1">
+                    <a:lumMod val="50000"/>
+                  </a:schemeClr>
+                </a:solidFill>
+              </a:rPr>
+              <a:t>Code Mentor Mauritius - Dotnet Sessions – Full Stack Web Development</a:t>
+            </a:r>
+            <a:endParaRPr lang="fr-FR" dirty="0"/>
+          </a:p>
+        </p:txBody>
+      </p:sp>
     </p:spTree>
     <p:extLst>
       <p:ext uri="{BB962C8B-B14F-4D97-AF65-F5344CB8AC3E}">
@@ -41530,6 +41740,48 @@
           </a:prstGeom>
         </p:spPr>
       </p:pic>
+      <p:sp>
+        <p:nvSpPr>
+          <p:cNvPr id="7" name="TextBox 6">
+            <a:extLst>
+              <a:ext uri="{FF2B5EF4-FFF2-40B4-BE49-F238E27FC236}">
+                <a16:creationId xmlns:a16="http://schemas.microsoft.com/office/drawing/2014/main" id="{E35A7629-BCEC-497D-91CF-235D91B2AE76}"/>
+              </a:ext>
+            </a:extLst>
+          </p:cNvPr>
+          <p:cNvSpPr txBox="1"/>
+          <p:nvPr/>
+        </p:nvSpPr>
+        <p:spPr>
+          <a:xfrm>
+            <a:off x="1097280" y="6409081"/>
+            <a:ext cx="6964540" cy="369332"/>
+          </a:xfrm>
+          <a:prstGeom prst="rect">
+            <a:avLst/>
+          </a:prstGeom>
+          <a:noFill/>
+        </p:spPr>
+        <p:txBody>
+          <a:bodyPr wrap="square">
+            <a:spAutoFit/>
+          </a:bodyPr>
+          <a:lstStyle/>
+          <a:p>
+            <a:r>
+              <a:rPr lang="en-GB" dirty="0">
+                <a:solidFill>
+                  <a:schemeClr val="accent1">
+                    <a:lumMod val="50000"/>
+                  </a:schemeClr>
+                </a:solidFill>
+              </a:rPr>
+              <a:t>Code Mentor Mauritius - Dotnet Sessions – Full Stack Web Development</a:t>
+            </a:r>
+            <a:endParaRPr lang="fr-FR" dirty="0"/>
+          </a:p>
+        </p:txBody>
+      </p:sp>
     </p:spTree>
     <p:extLst>
       <p:ext uri="{BB962C8B-B14F-4D97-AF65-F5344CB8AC3E}">
@@ -41725,6 +41977,48 @@
           </a:prstGeom>
         </p:spPr>
       </p:pic>
+      <p:sp>
+        <p:nvSpPr>
+          <p:cNvPr id="8" name="TextBox 7">
+            <a:extLst>
+              <a:ext uri="{FF2B5EF4-FFF2-40B4-BE49-F238E27FC236}">
+                <a16:creationId xmlns:a16="http://schemas.microsoft.com/office/drawing/2014/main" id="{58124FA3-D7AC-41B4-842A-2BE7ECA110AC}"/>
+              </a:ext>
+            </a:extLst>
+          </p:cNvPr>
+          <p:cNvSpPr txBox="1"/>
+          <p:nvPr/>
+        </p:nvSpPr>
+        <p:spPr>
+          <a:xfrm>
+            <a:off x="1097280" y="6409081"/>
+            <a:ext cx="6964540" cy="369332"/>
+          </a:xfrm>
+          <a:prstGeom prst="rect">
+            <a:avLst/>
+          </a:prstGeom>
+          <a:noFill/>
+        </p:spPr>
+        <p:txBody>
+          <a:bodyPr wrap="square">
+            <a:spAutoFit/>
+          </a:bodyPr>
+          <a:lstStyle/>
+          <a:p>
+            <a:r>
+              <a:rPr lang="en-GB" dirty="0">
+                <a:solidFill>
+                  <a:schemeClr val="accent1">
+                    <a:lumMod val="50000"/>
+                  </a:schemeClr>
+                </a:solidFill>
+              </a:rPr>
+              <a:t>Code Mentor Mauritius - Dotnet Sessions – Full Stack Web Development</a:t>
+            </a:r>
+            <a:endParaRPr lang="fr-FR" dirty="0"/>
+          </a:p>
+        </p:txBody>
+      </p:sp>
     </p:spTree>
     <p:extLst>
       <p:ext uri="{BB962C8B-B14F-4D97-AF65-F5344CB8AC3E}">
@@ -41890,6 +42184,48 @@
           </a:prstGeom>
         </p:spPr>
       </p:pic>
+      <p:sp>
+        <p:nvSpPr>
+          <p:cNvPr id="7" name="TextBox 6">
+            <a:extLst>
+              <a:ext uri="{FF2B5EF4-FFF2-40B4-BE49-F238E27FC236}">
+                <a16:creationId xmlns:a16="http://schemas.microsoft.com/office/drawing/2014/main" id="{CC7010E2-CF14-4707-A815-5164D5C65265}"/>
+              </a:ext>
+            </a:extLst>
+          </p:cNvPr>
+          <p:cNvSpPr txBox="1"/>
+          <p:nvPr/>
+        </p:nvSpPr>
+        <p:spPr>
+          <a:xfrm>
+            <a:off x="1097280" y="6409081"/>
+            <a:ext cx="6964540" cy="369332"/>
+          </a:xfrm>
+          <a:prstGeom prst="rect">
+            <a:avLst/>
+          </a:prstGeom>
+          <a:noFill/>
+        </p:spPr>
+        <p:txBody>
+          <a:bodyPr wrap="square">
+            <a:spAutoFit/>
+          </a:bodyPr>
+          <a:lstStyle/>
+          <a:p>
+            <a:r>
+              <a:rPr lang="en-GB" dirty="0">
+                <a:solidFill>
+                  <a:schemeClr val="accent1">
+                    <a:lumMod val="50000"/>
+                  </a:schemeClr>
+                </a:solidFill>
+              </a:rPr>
+              <a:t>Code Mentor Mauritius - Dotnet Sessions – Full Stack Web Development</a:t>
+            </a:r>
+            <a:endParaRPr lang="fr-FR" dirty="0"/>
+          </a:p>
+        </p:txBody>
+      </p:sp>
     </p:spTree>
     <p:extLst>
       <p:ext uri="{BB962C8B-B14F-4D97-AF65-F5344CB8AC3E}">
@@ -42025,6 +42361,48 @@
           </a:prstGeom>
         </p:spPr>
       </p:pic>
+      <p:sp>
+        <p:nvSpPr>
+          <p:cNvPr id="6" name="TextBox 5">
+            <a:extLst>
+              <a:ext uri="{FF2B5EF4-FFF2-40B4-BE49-F238E27FC236}">
+                <a16:creationId xmlns:a16="http://schemas.microsoft.com/office/drawing/2014/main" id="{1D605F66-4DCD-4191-A612-EC2D42DD750B}"/>
+              </a:ext>
+            </a:extLst>
+          </p:cNvPr>
+          <p:cNvSpPr txBox="1"/>
+          <p:nvPr/>
+        </p:nvSpPr>
+        <p:spPr>
+          <a:xfrm>
+            <a:off x="1097280" y="6409081"/>
+            <a:ext cx="6964540" cy="369332"/>
+          </a:xfrm>
+          <a:prstGeom prst="rect">
+            <a:avLst/>
+          </a:prstGeom>
+          <a:noFill/>
+        </p:spPr>
+        <p:txBody>
+          <a:bodyPr wrap="square">
+            <a:spAutoFit/>
+          </a:bodyPr>
+          <a:lstStyle/>
+          <a:p>
+            <a:r>
+              <a:rPr lang="en-GB" dirty="0">
+                <a:solidFill>
+                  <a:schemeClr val="accent1">
+                    <a:lumMod val="50000"/>
+                  </a:schemeClr>
+                </a:solidFill>
+              </a:rPr>
+              <a:t>Code Mentor Mauritius - Dotnet Sessions – Full Stack Web Development</a:t>
+            </a:r>
+            <a:endParaRPr lang="fr-FR" dirty="0"/>
+          </a:p>
+        </p:txBody>
+      </p:sp>
     </p:spTree>
     <p:extLst>
       <p:ext uri="{BB962C8B-B14F-4D97-AF65-F5344CB8AC3E}">
@@ -42160,6 +42538,48 @@
           </a:prstGeom>
         </p:spPr>
       </p:pic>
+      <p:sp>
+        <p:nvSpPr>
+          <p:cNvPr id="6" name="TextBox 5">
+            <a:extLst>
+              <a:ext uri="{FF2B5EF4-FFF2-40B4-BE49-F238E27FC236}">
+                <a16:creationId xmlns:a16="http://schemas.microsoft.com/office/drawing/2014/main" id="{E4C4A056-C937-4CB8-A790-7DF11C9AEBF7}"/>
+              </a:ext>
+            </a:extLst>
+          </p:cNvPr>
+          <p:cNvSpPr txBox="1"/>
+          <p:nvPr/>
+        </p:nvSpPr>
+        <p:spPr>
+          <a:xfrm>
+            <a:off x="1097280" y="6409081"/>
+            <a:ext cx="6964540" cy="369332"/>
+          </a:xfrm>
+          <a:prstGeom prst="rect">
+            <a:avLst/>
+          </a:prstGeom>
+          <a:noFill/>
+        </p:spPr>
+        <p:txBody>
+          <a:bodyPr wrap="square">
+            <a:spAutoFit/>
+          </a:bodyPr>
+          <a:lstStyle/>
+          <a:p>
+            <a:r>
+              <a:rPr lang="en-GB" dirty="0">
+                <a:solidFill>
+                  <a:schemeClr val="accent1">
+                    <a:lumMod val="50000"/>
+                  </a:schemeClr>
+                </a:solidFill>
+              </a:rPr>
+              <a:t>Code Mentor Mauritius - Dotnet Sessions – Full Stack Web Development</a:t>
+            </a:r>
+            <a:endParaRPr lang="fr-FR" dirty="0"/>
+          </a:p>
+        </p:txBody>
+      </p:sp>
     </p:spTree>
     <p:extLst>
       <p:ext uri="{BB962C8B-B14F-4D97-AF65-F5344CB8AC3E}">
@@ -42235,7 +42655,7 @@
             <p:ph idx="1"/>
             <p:extLst>
               <p:ext uri="{D42A27DB-BD31-4B8C-83A1-F6EECF244321}">
-                <p14:modId xmlns:p14="http://schemas.microsoft.com/office/powerpoint/2010/main" val="652199829"/>
+                <p14:modId xmlns:p14="http://schemas.microsoft.com/office/powerpoint/2010/main" val="2756997710"/>
               </p:ext>
             </p:extLst>
           </p:nvPr>
@@ -42295,6 +42715,48 @@
           </a:prstGeom>
         </p:spPr>
       </p:pic>
+      <p:sp>
+        <p:nvSpPr>
+          <p:cNvPr id="6" name="TextBox 5">
+            <a:extLst>
+              <a:ext uri="{FF2B5EF4-FFF2-40B4-BE49-F238E27FC236}">
+                <a16:creationId xmlns:a16="http://schemas.microsoft.com/office/drawing/2014/main" id="{9A09300A-2DD5-4889-92E3-3E988BCC2DFA}"/>
+              </a:ext>
+            </a:extLst>
+          </p:cNvPr>
+          <p:cNvSpPr txBox="1"/>
+          <p:nvPr/>
+        </p:nvSpPr>
+        <p:spPr>
+          <a:xfrm>
+            <a:off x="1097280" y="6409081"/>
+            <a:ext cx="6964540" cy="369332"/>
+          </a:xfrm>
+          <a:prstGeom prst="rect">
+            <a:avLst/>
+          </a:prstGeom>
+          <a:noFill/>
+        </p:spPr>
+        <p:txBody>
+          <a:bodyPr wrap="square">
+            <a:spAutoFit/>
+          </a:bodyPr>
+          <a:lstStyle/>
+          <a:p>
+            <a:r>
+              <a:rPr lang="en-GB" dirty="0">
+                <a:solidFill>
+                  <a:schemeClr val="accent1">
+                    <a:lumMod val="50000"/>
+                  </a:schemeClr>
+                </a:solidFill>
+              </a:rPr>
+              <a:t>Code Mentor Mauritius - Dotnet Sessions – Full Stack Web Development</a:t>
+            </a:r>
+            <a:endParaRPr lang="fr-FR" dirty="0"/>
+          </a:p>
+        </p:txBody>
+      </p:sp>
     </p:spTree>
     <p:extLst>
       <p:ext uri="{BB962C8B-B14F-4D97-AF65-F5344CB8AC3E}">
@@ -42430,6 +42892,48 @@
           </a:prstGeom>
         </p:spPr>
       </p:pic>
+      <p:sp>
+        <p:nvSpPr>
+          <p:cNvPr id="6" name="TextBox 5">
+            <a:extLst>
+              <a:ext uri="{FF2B5EF4-FFF2-40B4-BE49-F238E27FC236}">
+                <a16:creationId xmlns:a16="http://schemas.microsoft.com/office/drawing/2014/main" id="{4E194E5F-722A-43B8-8128-866491D562DD}"/>
+              </a:ext>
+            </a:extLst>
+          </p:cNvPr>
+          <p:cNvSpPr txBox="1"/>
+          <p:nvPr/>
+        </p:nvSpPr>
+        <p:spPr>
+          <a:xfrm>
+            <a:off x="1097280" y="6409081"/>
+            <a:ext cx="6964540" cy="369332"/>
+          </a:xfrm>
+          <a:prstGeom prst="rect">
+            <a:avLst/>
+          </a:prstGeom>
+          <a:noFill/>
+        </p:spPr>
+        <p:txBody>
+          <a:bodyPr wrap="square">
+            <a:spAutoFit/>
+          </a:bodyPr>
+          <a:lstStyle/>
+          <a:p>
+            <a:r>
+              <a:rPr lang="en-GB" dirty="0">
+                <a:solidFill>
+                  <a:schemeClr val="accent1">
+                    <a:lumMod val="50000"/>
+                  </a:schemeClr>
+                </a:solidFill>
+              </a:rPr>
+              <a:t>Code Mentor Mauritius - Dotnet Sessions – Full Stack Web Development</a:t>
+            </a:r>
+            <a:endParaRPr lang="fr-FR" dirty="0"/>
+          </a:p>
+        </p:txBody>
+      </p:sp>
     </p:spTree>
     <p:extLst>
       <p:ext uri="{BB962C8B-B14F-4D97-AF65-F5344CB8AC3E}">
@@ -42592,6 +43096,48 @@
           </a:prstGeom>
         </p:spPr>
       </p:pic>
+      <p:sp>
+        <p:nvSpPr>
+          <p:cNvPr id="6" name="TextBox 5">
+            <a:extLst>
+              <a:ext uri="{FF2B5EF4-FFF2-40B4-BE49-F238E27FC236}">
+                <a16:creationId xmlns:a16="http://schemas.microsoft.com/office/drawing/2014/main" id="{9FB076FE-D9F9-43CC-8CE5-3368110D5084}"/>
+              </a:ext>
+            </a:extLst>
+          </p:cNvPr>
+          <p:cNvSpPr txBox="1"/>
+          <p:nvPr/>
+        </p:nvSpPr>
+        <p:spPr>
+          <a:xfrm>
+            <a:off x="1097280" y="6409081"/>
+            <a:ext cx="6964540" cy="369332"/>
+          </a:xfrm>
+          <a:prstGeom prst="rect">
+            <a:avLst/>
+          </a:prstGeom>
+          <a:noFill/>
+        </p:spPr>
+        <p:txBody>
+          <a:bodyPr wrap="square">
+            <a:spAutoFit/>
+          </a:bodyPr>
+          <a:lstStyle/>
+          <a:p>
+            <a:r>
+              <a:rPr lang="en-GB" dirty="0">
+                <a:solidFill>
+                  <a:schemeClr val="accent1">
+                    <a:lumMod val="50000"/>
+                  </a:schemeClr>
+                </a:solidFill>
+              </a:rPr>
+              <a:t>Code Mentor Mauritius - Dotnet Sessions – Full Stack Web Development</a:t>
+            </a:r>
+            <a:endParaRPr lang="fr-FR" dirty="0"/>
+          </a:p>
+        </p:txBody>
+      </p:sp>
     </p:spTree>
     <p:extLst>
       <p:ext uri="{BB962C8B-B14F-4D97-AF65-F5344CB8AC3E}">
@@ -42814,6 +43360,48 @@
           </a:prstGeom>
         </p:spPr>
       </p:pic>
+      <p:sp>
+        <p:nvSpPr>
+          <p:cNvPr id="7" name="TextBox 6">
+            <a:extLst>
+              <a:ext uri="{FF2B5EF4-FFF2-40B4-BE49-F238E27FC236}">
+                <a16:creationId xmlns:a16="http://schemas.microsoft.com/office/drawing/2014/main" id="{FF79AD03-B69B-4F34-A4AA-7FC13734179B}"/>
+              </a:ext>
+            </a:extLst>
+          </p:cNvPr>
+          <p:cNvSpPr txBox="1"/>
+          <p:nvPr/>
+        </p:nvSpPr>
+        <p:spPr>
+          <a:xfrm>
+            <a:off x="1097280" y="6409081"/>
+            <a:ext cx="6964540" cy="369332"/>
+          </a:xfrm>
+          <a:prstGeom prst="rect">
+            <a:avLst/>
+          </a:prstGeom>
+          <a:noFill/>
+        </p:spPr>
+        <p:txBody>
+          <a:bodyPr wrap="square">
+            <a:spAutoFit/>
+          </a:bodyPr>
+          <a:lstStyle/>
+          <a:p>
+            <a:r>
+              <a:rPr lang="en-GB" dirty="0">
+                <a:solidFill>
+                  <a:schemeClr val="accent1">
+                    <a:lumMod val="50000"/>
+                  </a:schemeClr>
+                </a:solidFill>
+              </a:rPr>
+              <a:t>Code Mentor Mauritius - Dotnet Sessions – Full Stack Web Development</a:t>
+            </a:r>
+            <a:endParaRPr lang="fr-FR" dirty="0"/>
+          </a:p>
+        </p:txBody>
+      </p:sp>
     </p:spTree>
     <p:extLst>
       <p:ext uri="{BB962C8B-B14F-4D97-AF65-F5344CB8AC3E}">
@@ -42949,6 +43537,48 @@
           </a:prstGeom>
         </p:spPr>
       </p:pic>
+      <p:sp>
+        <p:nvSpPr>
+          <p:cNvPr id="6" name="TextBox 5">
+            <a:extLst>
+              <a:ext uri="{FF2B5EF4-FFF2-40B4-BE49-F238E27FC236}">
+                <a16:creationId xmlns:a16="http://schemas.microsoft.com/office/drawing/2014/main" id="{B6580A5B-A0E1-45A3-A190-642C961FBA9A}"/>
+              </a:ext>
+            </a:extLst>
+          </p:cNvPr>
+          <p:cNvSpPr txBox="1"/>
+          <p:nvPr/>
+        </p:nvSpPr>
+        <p:spPr>
+          <a:xfrm>
+            <a:off x="1097280" y="6409081"/>
+            <a:ext cx="6964540" cy="369332"/>
+          </a:xfrm>
+          <a:prstGeom prst="rect">
+            <a:avLst/>
+          </a:prstGeom>
+          <a:noFill/>
+        </p:spPr>
+        <p:txBody>
+          <a:bodyPr wrap="square">
+            <a:spAutoFit/>
+          </a:bodyPr>
+          <a:lstStyle/>
+          <a:p>
+            <a:r>
+              <a:rPr lang="en-GB" dirty="0">
+                <a:solidFill>
+                  <a:schemeClr val="accent1">
+                    <a:lumMod val="50000"/>
+                  </a:schemeClr>
+                </a:solidFill>
+              </a:rPr>
+              <a:t>Code Mentor Mauritius - Dotnet Sessions – Full Stack Web Development</a:t>
+            </a:r>
+            <a:endParaRPr lang="fr-FR" dirty="0"/>
+          </a:p>
+        </p:txBody>
+      </p:sp>
     </p:spTree>
     <p:extLst>
       <p:ext uri="{BB962C8B-B14F-4D97-AF65-F5344CB8AC3E}">
@@ -43084,6 +43714,48 @@
           </a:prstGeom>
         </p:spPr>
       </p:pic>
+      <p:sp>
+        <p:nvSpPr>
+          <p:cNvPr id="6" name="TextBox 5">
+            <a:extLst>
+              <a:ext uri="{FF2B5EF4-FFF2-40B4-BE49-F238E27FC236}">
+                <a16:creationId xmlns:a16="http://schemas.microsoft.com/office/drawing/2014/main" id="{C0A174B7-38D7-4925-89F5-3D69FEAF3333}"/>
+              </a:ext>
+            </a:extLst>
+          </p:cNvPr>
+          <p:cNvSpPr txBox="1"/>
+          <p:nvPr/>
+        </p:nvSpPr>
+        <p:spPr>
+          <a:xfrm>
+            <a:off x="1097280" y="6409081"/>
+            <a:ext cx="6964540" cy="369332"/>
+          </a:xfrm>
+          <a:prstGeom prst="rect">
+            <a:avLst/>
+          </a:prstGeom>
+          <a:noFill/>
+        </p:spPr>
+        <p:txBody>
+          <a:bodyPr wrap="square">
+            <a:spAutoFit/>
+          </a:bodyPr>
+          <a:lstStyle/>
+          <a:p>
+            <a:r>
+              <a:rPr lang="en-GB" dirty="0">
+                <a:solidFill>
+                  <a:schemeClr val="accent1">
+                    <a:lumMod val="50000"/>
+                  </a:schemeClr>
+                </a:solidFill>
+              </a:rPr>
+              <a:t>Code Mentor Mauritius - Dotnet Sessions – Full Stack Web Development</a:t>
+            </a:r>
+            <a:endParaRPr lang="fr-FR" dirty="0"/>
+          </a:p>
+        </p:txBody>
+      </p:sp>
     </p:spTree>
     <p:extLst>
       <p:ext uri="{BB962C8B-B14F-4D97-AF65-F5344CB8AC3E}">

</xml_diff>